<commit_message>
Izmena pp i ociscen kod
</commit_message>
<xml_diff>
--- a/poster-powerpoint.pptx
+++ b/poster-powerpoint.pptx
@@ -3288,7 +3288,7 @@
               </a:spcAft>
             </a:pPr>
             <a:r>
-              <a:rPr lang="en-US" sz="4800" b="1" noProof="1" smtClean="0">
+              <a:rPr lang="en-US" sz="4800" b="1" noProof="1">
                 <a:solidFill>
                   <a:schemeClr val="accent1">
                     <a:lumMod val="75000"/>
@@ -3298,14 +3298,6 @@
               </a:rPr>
               <a:t>Uvod</a:t>
             </a:r>
-            <a:endParaRPr lang="en-US" sz="4800" b="1" noProof="1">
-              <a:solidFill>
-                <a:schemeClr val="accent1">
-                  <a:lumMod val="75000"/>
-                </a:schemeClr>
-              </a:solidFill>
-              <a:latin typeface="+mj-lt"/>
-            </a:endParaRPr>
           </a:p>
         </p:txBody>
       </p:sp>
@@ -5305,7 +5297,7 @@
           </a:p>
           <a:p>
             <a:r>
-              <a:rPr lang="en-US" sz="9600" smtClean="0">
+              <a:rPr lang="en-US" sz="9600">
                 <a:solidFill>
                   <a:schemeClr val="accent1">
                     <a:lumMod val="75000"/>
@@ -5315,7 +5307,7 @@
               <a:t> </a:t>
             </a:r>
             <a:r>
-              <a:rPr lang="en-US" sz="9600" noProof="1" smtClean="0">
+              <a:rPr lang="en-US" sz="9600" noProof="1">
                 <a:solidFill>
                   <a:schemeClr val="accent1">
                     <a:lumMod val="75000"/>
@@ -5325,7 +5317,7 @@
               <a:t>Prepoznavanje pesme na osnovu isečka u igri </a:t>
             </a:r>
             <a:r>
-              <a:rPr lang="en-US" sz="9600" smtClean="0">
+              <a:rPr lang="en-US" sz="9600">
                 <a:solidFill>
                   <a:schemeClr val="accent1">
                     <a:lumMod val="75000"/>
@@ -5337,7 +5329,7 @@
           </a:p>
           <a:p>
             <a:r>
-              <a:rPr lang="en-US" sz="9600" b="1" noProof="1" smtClean="0">
+              <a:rPr lang="en-US" sz="9600" b="1" noProof="1">
                 <a:solidFill>
                   <a:srgbClr val="C00000"/>
                 </a:solidFill>
@@ -5345,7 +5337,7 @@
               <a:t> </a:t>
             </a:r>
             <a:r>
-              <a:rPr lang="en-US" sz="6600" b="1" noProof="1" smtClean="0">
+              <a:rPr lang="en-US" sz="6600" b="1" noProof="1">
                 <a:solidFill>
                   <a:schemeClr val="tx1"/>
                 </a:solidFill>
@@ -5355,7 +5347,7 @@
           </a:p>
           <a:p>
             <a:r>
-              <a:rPr lang="en-US" sz="4800" smtClean="0">
+              <a:rPr lang="en-US" sz="4800">
                 <a:solidFill>
                   <a:schemeClr val="tx1"/>
                 </a:solidFill>
@@ -5363,7 +5355,7 @@
               <a:t>  </a:t>
             </a:r>
             <a:r>
-              <a:rPr lang="en-US" sz="4800" noProof="1" smtClean="0">
+              <a:rPr lang="en-US" sz="4800" noProof="1">
                 <a:solidFill>
                   <a:schemeClr val="tx1"/>
                 </a:solidFill>
@@ -5460,10 +5452,9 @@
               <a:defRPr/>
             </a:pPr>
             <a:r>
-              <a:rPr lang="en-US" sz="4000" i="1" smtClean="0"/>
+              <a:rPr lang="en-US" sz="4000" i="1"/>
               <a:t>Primer jedne partije u igri</a:t>
             </a:r>
-            <a:endParaRPr lang="en-US" sz="4000" i="1"/>
           </a:p>
         </p:txBody>
       </p:sp>
@@ -5521,12 +5512,8 @@
           <a:p>
             <a:pPr algn="just"/>
             <a:r>
-              <a:rPr lang="en-US" sz="4400" smtClean="0"/>
-              <a:t>Cilj aplikacije je </a:t>
-            </a:r>
-            <a:r>
               <a:rPr lang="en-US" sz="4400"/>
-              <a:t>automatizovano prepoznavanje pesme u video igri </a:t>
+              <a:t>Cilj aplikacije je automatizovano prepoznavanje pesme u video igri </a:t>
             </a:r>
             <a:r>
               <a:rPr lang="en-US" sz="4400" i="1"/>
@@ -5544,11 +5531,7 @@
             </a:r>
             <a:r>
               <a:rPr lang="en-US" sz="4400"/>
-              <a:t> odgovora koji predstavljaju ili numeru ili izvođača. </a:t>
-            </a:r>
-            <a:r>
-              <a:rPr lang="en-US" sz="4400" smtClean="0"/>
-              <a:t>Aplikacija se sastoji iz tri dela: </a:t>
+              <a:t> odgovora koji predstavljaju ili numeru ili izvođača. Aplikacija se sastoji iz tri dela: </a:t>
             </a:r>
           </a:p>
           <a:p>
@@ -5558,11 +5541,7 @@
             </a:pPr>
             <a:r>
               <a:rPr lang="en-US" sz="4400"/>
-              <a:t>A</a:t>
-            </a:r>
-            <a:r>
-              <a:rPr lang="en-US" sz="4400" smtClean="0"/>
-              <a:t>utomatsko upravljanje aplikacijom</a:t>
+              <a:t>Automatsko upravljanje aplikacijom</a:t>
             </a:r>
           </a:p>
           <a:p>
@@ -5571,7 +5550,7 @@
               <a:buChar char="•"/>
             </a:pPr>
             <a:r>
-              <a:rPr lang="en-US" sz="4400" smtClean="0"/>
+              <a:rPr lang="en-US" sz="4400"/>
               <a:t>Prepoznavanje pesme </a:t>
             </a:r>
           </a:p>
@@ -5581,10 +5560,9 @@
               <a:buChar char="•"/>
             </a:pPr>
             <a:r>
-              <a:rPr lang="en-US" sz="4400" smtClean="0"/>
+              <a:rPr lang="en-US" sz="4400"/>
               <a:t>Prepoznavanje ponuđenih odgovora</a:t>
             </a:r>
-            <a:endParaRPr lang="en-US" sz="4400"/>
           </a:p>
         </p:txBody>
       </p:sp>
@@ -5906,7 +5884,7 @@
               </a:spcAft>
             </a:pPr>
             <a:r>
-              <a:rPr lang="en-US" sz="4800" b="1" noProof="1" smtClean="0">
+              <a:rPr lang="en-US" sz="4800" b="1" noProof="1">
                 <a:solidFill>
                   <a:schemeClr val="accent1">
                     <a:lumMod val="75000"/>
@@ -5916,14 +5894,6 @@
               </a:rPr>
               <a:t>Skup podataka</a:t>
             </a:r>
-            <a:endParaRPr lang="en-US" sz="4800" b="1" noProof="1">
-              <a:solidFill>
-                <a:schemeClr val="accent1">
-                  <a:lumMod val="75000"/>
-                </a:schemeClr>
-              </a:solidFill>
-              <a:latin typeface="+mj-lt"/>
-            </a:endParaRPr>
           </a:p>
         </p:txBody>
       </p:sp>
@@ -5951,50 +5921,17 @@
           <a:p>
             <a:pPr algn="just"/>
             <a:r>
-              <a:rPr lang="en-US" sz="4400" smtClean="0"/>
-              <a:t>Kao skup podataka korištena je jedna od </a:t>
-            </a:r>
-            <a:r>
               <a:rPr lang="en-US" sz="4400"/>
-              <a:t>plejlista dostunih u </a:t>
-            </a:r>
-            <a:r>
-              <a:rPr lang="en-US" sz="4400" smtClean="0"/>
-              <a:t>igri</a:t>
+              <a:t>Kao skup podataka korištena je jedna od plejlista dostunih u igri (</a:t>
+            </a:r>
+            <a:r>
+              <a:rPr lang="en-US" sz="4400" i="1"/>
+              <a:t>Today’s Hits UK</a:t>
             </a:r>
             <a:r>
               <a:rPr lang="en-US" sz="4400"/>
-              <a:t> </a:t>
-            </a:r>
-            <a:r>
-              <a:rPr lang="en-US" sz="4400" smtClean="0"/>
-              <a:t>(</a:t>
-            </a:r>
-            <a:r>
-              <a:rPr lang="en-US" sz="4400" i="1" smtClean="0"/>
-              <a:t>Today’s Hits UK</a:t>
-            </a:r>
-            <a:r>
-              <a:rPr lang="en-US" sz="4400" smtClean="0"/>
-              <a:t>). Generisani su isečci za većinu  pesama (118). Za </a:t>
-            </a:r>
-            <a:r>
-              <a:rPr lang="en-US" sz="4400"/>
-              <a:t>prepoznavanje ponuđenih </a:t>
-            </a:r>
-            <a:r>
-              <a:rPr lang="en-US" sz="4400" smtClean="0"/>
-              <a:t>odgovora i automatsko upravljanje aplikacijom korištene su slike </a:t>
-            </a:r>
-            <a:r>
-              <a:rPr lang="en-US" sz="4400"/>
-              <a:t>ekrana </a:t>
-            </a:r>
-            <a:r>
-              <a:rPr lang="en-US" sz="4400" smtClean="0"/>
-              <a:t>igre.</a:t>
-            </a:r>
-            <a:endParaRPr lang="en-US" sz="4400"/>
+              <a:t>). Generisani su isečci za većinu  pesama (118). Za prepoznavanje ponuđenih odgovora i automatsko upravljanje aplikacijom korištene su slike ekrana igre.</a:t>
+            </a:r>
           </a:p>
         </p:txBody>
       </p:sp>
@@ -6316,7 +6253,7 @@
               </a:spcAft>
             </a:pPr>
             <a:r>
-              <a:rPr lang="en-US" sz="4800" b="1" noProof="1" smtClean="0">
+              <a:rPr lang="en-US" sz="4800" b="1" noProof="1">
                 <a:solidFill>
                   <a:schemeClr val="accent1">
                     <a:lumMod val="75000"/>
@@ -6326,14 +6263,6 @@
               </a:rPr>
               <a:t>Automatsko upravljanje aplikacijom</a:t>
             </a:r>
-            <a:endParaRPr lang="en-US" sz="4800" b="1" noProof="1">
-              <a:solidFill>
-                <a:schemeClr val="accent1">
-                  <a:lumMod val="75000"/>
-                </a:schemeClr>
-              </a:solidFill>
-              <a:latin typeface="+mj-lt"/>
-            </a:endParaRPr>
           </a:p>
         </p:txBody>
       </p:sp>
@@ -6346,7 +6275,7 @@
         <p:spPr>
           <a:xfrm>
             <a:off x="907246" y="22759809"/>
-            <a:ext cx="9662659" cy="4832092"/>
+            <a:ext cx="9662659" cy="8217634"/>
           </a:xfrm>
           <a:prstGeom prst="rect">
             <a:avLst/>
@@ -6361,34 +6290,274 @@
           <a:p>
             <a:pPr algn="just"/>
             <a:r>
-              <a:rPr lang="en-US" sz="4400" smtClean="0"/>
-              <a:t>Na ekranu igre prepoznaju se akcije na osnovu odgovarajućih sličica (npr. dugme za novu igru). Njihova lokacija na ekranu se detektuje metodom “</a:t>
-            </a:r>
-            <a:r>
-              <a:rPr lang="en-US" sz="4400" i="1" smtClean="0"/>
+              <a:rPr lang="en-US" sz="4400" dirty="0"/>
+              <a:t>Na </a:t>
+            </a:r>
+            <a:r>
+              <a:rPr lang="en-US" sz="4400" dirty="0" err="1"/>
+              <a:t>ekranu</a:t>
+            </a:r>
+            <a:r>
+              <a:rPr lang="en-US" sz="4400" dirty="0"/>
+              <a:t> </a:t>
+            </a:r>
+            <a:r>
+              <a:rPr lang="en-US" sz="4400" dirty="0" err="1"/>
+              <a:t>igre</a:t>
+            </a:r>
+            <a:r>
+              <a:rPr lang="en-US" sz="4400" dirty="0"/>
+              <a:t> </a:t>
+            </a:r>
+            <a:r>
+              <a:rPr lang="en-US" sz="4400" dirty="0" err="1"/>
+              <a:t>prepoznaju</a:t>
+            </a:r>
+            <a:r>
+              <a:rPr lang="en-US" sz="4400" dirty="0"/>
+              <a:t> se </a:t>
+            </a:r>
+            <a:r>
+              <a:rPr lang="en-US" sz="4400" dirty="0" err="1"/>
+              <a:t>akcije</a:t>
+            </a:r>
+            <a:r>
+              <a:rPr lang="en-US" sz="4400" dirty="0"/>
+              <a:t> </a:t>
+            </a:r>
+            <a:r>
+              <a:rPr lang="en-US" sz="4400" dirty="0" err="1"/>
+              <a:t>na</a:t>
+            </a:r>
+            <a:r>
+              <a:rPr lang="en-US" sz="4400" dirty="0"/>
+              <a:t> </a:t>
+            </a:r>
+            <a:r>
+              <a:rPr lang="en-US" sz="4400" dirty="0" err="1"/>
+              <a:t>osnovu</a:t>
+            </a:r>
+            <a:r>
+              <a:rPr lang="en-US" sz="4400" dirty="0"/>
+              <a:t> </a:t>
+            </a:r>
+            <a:r>
+              <a:rPr lang="en-US" sz="4400" dirty="0" err="1"/>
+              <a:t>odgovarajućih</a:t>
+            </a:r>
+            <a:r>
+              <a:rPr lang="en-US" sz="4400" dirty="0"/>
+              <a:t> </a:t>
+            </a:r>
+            <a:r>
+              <a:rPr lang="en-US" sz="4400" dirty="0" err="1"/>
+              <a:t>sličica</a:t>
+            </a:r>
+            <a:r>
+              <a:rPr lang="en-US" sz="4400" dirty="0"/>
+              <a:t> (</a:t>
+            </a:r>
+            <a:r>
+              <a:rPr lang="en-US" sz="4400" dirty="0" err="1"/>
+              <a:t>npr</a:t>
+            </a:r>
+            <a:r>
+              <a:rPr lang="en-US" sz="4400" dirty="0"/>
+              <a:t>. </a:t>
+            </a:r>
+            <a:r>
+              <a:rPr lang="en-US" sz="4400" dirty="0" err="1"/>
+              <a:t>dugme</a:t>
+            </a:r>
+            <a:r>
+              <a:rPr lang="en-US" sz="4400" dirty="0"/>
+              <a:t> za </a:t>
+            </a:r>
+            <a:r>
+              <a:rPr lang="en-US" sz="4400" dirty="0" err="1"/>
+              <a:t>novu</a:t>
+            </a:r>
+            <a:r>
+              <a:rPr lang="en-US" sz="4400" dirty="0"/>
+              <a:t> </a:t>
+            </a:r>
+            <a:r>
+              <a:rPr lang="en-US" sz="4400" dirty="0" err="1"/>
+              <a:t>igru</a:t>
+            </a:r>
+            <a:r>
+              <a:rPr lang="en-US" sz="4400" dirty="0"/>
+              <a:t>). </a:t>
+            </a:r>
+            <a:r>
+              <a:rPr lang="en-US" sz="4400" dirty="0" err="1"/>
+              <a:t>Njihova</a:t>
+            </a:r>
+            <a:r>
+              <a:rPr lang="en-US" sz="4400" dirty="0"/>
+              <a:t> </a:t>
+            </a:r>
+            <a:r>
+              <a:rPr lang="en-US" sz="4400" dirty="0" err="1"/>
+              <a:t>lokacija</a:t>
+            </a:r>
+            <a:r>
+              <a:rPr lang="en-US" sz="4400" dirty="0"/>
+              <a:t> </a:t>
+            </a:r>
+            <a:r>
+              <a:rPr lang="en-US" sz="4400" dirty="0" err="1"/>
+              <a:t>na</a:t>
+            </a:r>
+            <a:r>
+              <a:rPr lang="en-US" sz="4400" dirty="0"/>
+              <a:t> </a:t>
+            </a:r>
+            <a:r>
+              <a:rPr lang="en-US" sz="4400" dirty="0" err="1"/>
+              <a:t>ekranu</a:t>
+            </a:r>
+            <a:r>
+              <a:rPr lang="en-US" sz="4400" dirty="0"/>
+              <a:t> se </a:t>
+            </a:r>
+            <a:r>
+              <a:rPr lang="en-US" sz="4400" dirty="0" err="1"/>
+              <a:t>detektuje</a:t>
+            </a:r>
+            <a:r>
+              <a:rPr lang="en-US" sz="4400" dirty="0"/>
+              <a:t> </a:t>
+            </a:r>
+            <a:r>
+              <a:rPr lang="en-US" sz="4400" dirty="0" err="1"/>
+              <a:t>metodom</a:t>
+            </a:r>
+            <a:r>
+              <a:rPr lang="en-US" sz="4400" dirty="0"/>
+              <a:t> “</a:t>
+            </a:r>
+            <a:r>
+              <a:rPr lang="en-US" sz="4400" i="1" dirty="0" err="1"/>
               <a:t>matchTemplate</a:t>
             </a:r>
             <a:r>
-              <a:rPr lang="en-US" sz="4400" smtClean="0"/>
-              <a:t>” biblioteke “</a:t>
-            </a:r>
-            <a:r>
-              <a:rPr lang="en-US" sz="4400" i="1" smtClean="0"/>
+              <a:rPr lang="en-US" sz="4400" dirty="0"/>
+              <a:t>” </a:t>
+            </a:r>
+            <a:r>
+              <a:rPr lang="en-US" sz="4400" dirty="0" err="1"/>
+              <a:t>biblioteke</a:t>
+            </a:r>
+            <a:r>
+              <a:rPr lang="en-US" sz="4400" dirty="0"/>
+              <a:t> “</a:t>
+            </a:r>
+            <a:r>
+              <a:rPr lang="en-US" sz="4400" i="1" dirty="0" err="1"/>
               <a:t>opencv</a:t>
             </a:r>
             <a:r>
-              <a:rPr lang="en-US" sz="4400" smtClean="0"/>
-              <a:t>” koja koristi konvoluciju, a samo upravljanje odrađeno je pomoću biblioteke “</a:t>
-            </a:r>
-            <a:r>
-              <a:rPr lang="en-US" sz="4400" i="1" smtClean="0"/>
+              <a:rPr lang="en-US" sz="4400" dirty="0"/>
+              <a:t>” </a:t>
+            </a:r>
+            <a:r>
+              <a:rPr lang="en-US" sz="4400" dirty="0" err="1"/>
+              <a:t>koja</a:t>
+            </a:r>
+            <a:r>
+              <a:rPr lang="en-US" sz="4400" dirty="0"/>
+              <a:t> </a:t>
+            </a:r>
+            <a:r>
+              <a:rPr lang="en-US" sz="4400" dirty="0" err="1"/>
+              <a:t>koristi</a:t>
+            </a:r>
+            <a:r>
+              <a:rPr lang="en-US" sz="4400" dirty="0"/>
+              <a:t> </a:t>
+            </a:r>
+            <a:r>
+              <a:rPr lang="en-US" sz="4400" dirty="0" err="1"/>
+              <a:t>konvoluciju</a:t>
+            </a:r>
+            <a:r>
+              <a:rPr lang="en-US" sz="4400" dirty="0"/>
+              <a:t>, a </a:t>
+            </a:r>
+            <a:r>
+              <a:rPr lang="en-US" sz="4400" dirty="0" err="1"/>
+              <a:t>samo</a:t>
+            </a:r>
+            <a:r>
+              <a:rPr lang="en-US" sz="4400" dirty="0"/>
+              <a:t> </a:t>
+            </a:r>
+            <a:r>
+              <a:rPr lang="en-US" sz="4400" dirty="0" err="1"/>
+              <a:t>upravljanje</a:t>
+            </a:r>
+            <a:r>
+              <a:rPr lang="en-US" sz="4400" dirty="0"/>
+              <a:t> </a:t>
+            </a:r>
+            <a:r>
+              <a:rPr lang="en-US" sz="4400" dirty="0" err="1"/>
+              <a:t>odrađeno</a:t>
+            </a:r>
+            <a:r>
+              <a:rPr lang="en-US" sz="4400" dirty="0"/>
+              <a:t> je </a:t>
+            </a:r>
+            <a:r>
+              <a:rPr lang="en-US" sz="4400" dirty="0" err="1"/>
+              <a:t>pomoću</a:t>
+            </a:r>
+            <a:r>
+              <a:rPr lang="en-US" sz="4400" dirty="0"/>
+              <a:t> </a:t>
+            </a:r>
+            <a:r>
+              <a:rPr lang="en-US" sz="4400" dirty="0" err="1"/>
+              <a:t>biblioteke</a:t>
+            </a:r>
+            <a:r>
+              <a:rPr lang="en-US" sz="4400" dirty="0"/>
+              <a:t> “</a:t>
+            </a:r>
+            <a:r>
+              <a:rPr lang="en-US" sz="4400" i="1" dirty="0" err="1"/>
               <a:t>pyautogui</a:t>
             </a:r>
             <a:r>
-              <a:rPr lang="en-US" sz="4400" smtClean="0"/>
+              <a:rPr lang="en-US" sz="4400" dirty="0"/>
               <a:t>”.</a:t>
             </a:r>
-            <a:endParaRPr lang="en-US" sz="4400"/>
+            <a:r>
+              <a:rPr lang="sr-Latn-RS" sz="4400" dirty="0"/>
+              <a:t> Međutim da bi detektovali kada je </a:t>
+            </a:r>
+            <a:r>
+              <a:rPr lang="sr-Latn-RS" sz="4400" dirty="0" err="1"/>
+              <a:t>igrica</a:t>
+            </a:r>
+            <a:r>
+              <a:rPr lang="sr-Latn-RS" sz="4400" dirty="0"/>
+              <a:t> pustila pesmu korištena je </a:t>
+            </a:r>
+            <a:r>
+              <a:rPr lang="sr-Latn-RS" sz="4400" dirty="0" err="1"/>
+              <a:t>konvoluciona</a:t>
+            </a:r>
+            <a:r>
+              <a:rPr lang="sr-Latn-RS" sz="4400"/>
+              <a:t> mreža. </a:t>
+            </a:r>
+            <a:r>
+              <a:rPr lang="sr-Latn-RS" sz="4400" dirty="0"/>
+              <a:t>Mreža bi posmatrala grafičke elemente koji ukazuju na početak pesme i njen kraj.</a:t>
+            </a:r>
+            <a:endParaRPr lang="en-US" sz="4400" dirty="0"/>
           </a:p>
         </p:txBody>
       </p:sp>
@@ -6733,7 +6902,7 @@
               </a:spcAft>
             </a:pPr>
             <a:r>
-              <a:rPr lang="en-US" sz="4800" b="1" noProof="1" smtClean="0">
+              <a:rPr lang="en-US" sz="4800" b="1" noProof="1">
                 <a:solidFill>
                   <a:schemeClr val="accent1">
                     <a:lumMod val="75000"/>
@@ -6743,14 +6912,6 @@
               </a:rPr>
               <a:t>Prepoznavanje pesme</a:t>
             </a:r>
-            <a:endParaRPr lang="en-US" sz="4800" b="1" noProof="1">
-              <a:solidFill>
-                <a:schemeClr val="accent1">
-                  <a:lumMod val="75000"/>
-                </a:schemeClr>
-              </a:solidFill>
-              <a:latin typeface="+mj-lt"/>
-            </a:endParaRPr>
           </a:p>
         </p:txBody>
       </p:sp>
@@ -6778,20 +6939,8 @@
           <a:p>
             <a:pPr algn="just"/>
             <a:r>
-              <a:rPr lang="en-US" sz="4400" smtClean="0"/>
-              <a:t>Za </a:t>
-            </a:r>
-            <a:r>
               <a:rPr lang="en-US" sz="4400"/>
-              <a:t>prepoznavanje pesme </a:t>
-            </a:r>
-            <a:r>
-              <a:rPr lang="en-US" sz="4400" smtClean="0"/>
-              <a:t>korišten je</a:t>
-            </a:r>
-            <a:r>
-              <a:rPr lang="en-US" sz="4400"/>
-              <a:t> </a:t>
+              <a:t>Za prepoznavanje pesme korišten je </a:t>
             </a:r>
             <a:r>
               <a:rPr lang="en-US" sz="4400" i="1"/>
@@ -6799,50 +6948,46 @@
             </a:r>
             <a:r>
               <a:rPr lang="en-US" sz="4400"/>
-              <a:t>, koji je osnova za aplikaciju Shazam</a:t>
-            </a:r>
-            <a:r>
-              <a:rPr lang="en-US" sz="4400" smtClean="0"/>
-              <a:t>. Algoritam pravi “otisak” (</a:t>
-            </a:r>
-            <a:r>
-              <a:rPr lang="en-US" sz="4400" i="1" smtClean="0"/>
+              <a:t>, koji je osnova za aplikaciju Shazam. Algoritam pravi “otisak” (</a:t>
+            </a:r>
+            <a:r>
+              <a:rPr lang="en-US" sz="4400" i="1"/>
               <a:t>fingerprint</a:t>
             </a:r>
             <a:r>
-              <a:rPr lang="en-US" sz="4400" smtClean="0"/>
+              <a:rPr lang="en-US" sz="4400"/>
               <a:t>) audio fajla na osnovu spektrograma gde y-osa predstavlja frekvenciju, x-osa predstavlja vreme a boja predstavlja amplitudu (metoda </a:t>
             </a:r>
             <a:r>
-              <a:rPr lang="en-US" sz="4400" i="1" smtClean="0"/>
+              <a:rPr lang="en-US" sz="4400" i="1"/>
               <a:t>specgram</a:t>
             </a:r>
             <a:r>
-              <a:rPr lang="en-US" sz="4400" smtClean="0"/>
+              <a:rPr lang="en-US" sz="4400"/>
               <a:t> biblioteke </a:t>
             </a:r>
             <a:r>
-              <a:rPr lang="en-US" sz="4400" i="1" smtClean="0"/>
+              <a:rPr lang="en-US" sz="4400" i="1"/>
               <a:t>matplotlib.mlab</a:t>
             </a:r>
             <a:r>
-              <a:rPr lang="en-US" sz="4400" smtClean="0"/>
+              <a:rPr lang="en-US" sz="4400"/>
               <a:t>). Izdvajaju se najveće amplitude (</a:t>
             </a:r>
             <a:r>
-              <a:rPr lang="en-US" sz="4400" i="1" smtClean="0"/>
+              <a:rPr lang="en-US" sz="4400" i="1"/>
               <a:t>peaks</a:t>
             </a:r>
             <a:r>
-              <a:rPr lang="en-US" sz="4400" smtClean="0"/>
+              <a:rPr lang="en-US" sz="4400"/>
               <a:t>) za svaki frekvencijski interval. Na osnovu njih se formiraju heševi koji se čuvaju u bazi (</a:t>
             </a:r>
             <a:r>
-              <a:rPr lang="en-US" sz="4400" i="1" smtClean="0"/>
+              <a:rPr lang="en-US" sz="4400" i="1"/>
               <a:t>sqlite3</a:t>
             </a:r>
             <a:r>
-              <a:rPr lang="en-US" sz="4400" smtClean="0"/>
+              <a:rPr lang="en-US" sz="4400"/>
               <a:t>), zajedno sa identifikatorom pesme (naziv pesme i ime izvođača). </a:t>
             </a:r>
           </a:p>
@@ -6937,10 +7082,261 @@
           <a:p>
             <a:pPr algn="just"/>
             <a:r>
-              <a:rPr lang="en-US" sz="4400" smtClean="0"/>
-              <a:t>Kada program detektuje početak isečka pesme u igri, taj isečak se snima i na osnovu njega se pravi novi fingerprint. Dobijeni fingerprint se poredi sa podacima u bazi, i kao rezultat se uzima pesma čiji fingerprint iz baze se najviše podudara sa novim fingerprintom.</a:t>
-            </a:r>
-            <a:endParaRPr lang="en-US" sz="4400"/>
+              <a:rPr lang="en-US" sz="4400" dirty="0" err="1"/>
+              <a:t>Kada</a:t>
+            </a:r>
+            <a:r>
+              <a:rPr lang="en-US" sz="4400" dirty="0"/>
+              <a:t> program </a:t>
+            </a:r>
+            <a:r>
+              <a:rPr lang="en-US" sz="4400" dirty="0" err="1"/>
+              <a:t>detektuje</a:t>
+            </a:r>
+            <a:r>
+              <a:rPr lang="en-US" sz="4400" dirty="0"/>
+              <a:t> </a:t>
+            </a:r>
+            <a:r>
+              <a:rPr lang="en-US" sz="4400" dirty="0" err="1"/>
+              <a:t>početak</a:t>
+            </a:r>
+            <a:r>
+              <a:rPr lang="en-US" sz="4400" dirty="0"/>
+              <a:t> </a:t>
+            </a:r>
+            <a:r>
+              <a:rPr lang="en-US" sz="4400" dirty="0" err="1"/>
+              <a:t>isečka</a:t>
+            </a:r>
+            <a:r>
+              <a:rPr lang="en-US" sz="4400" dirty="0"/>
+              <a:t> </a:t>
+            </a:r>
+            <a:r>
+              <a:rPr lang="en-US" sz="4400" dirty="0" err="1"/>
+              <a:t>pesme</a:t>
+            </a:r>
+            <a:r>
+              <a:rPr lang="en-US" sz="4400" dirty="0"/>
+              <a:t> u </a:t>
+            </a:r>
+            <a:r>
+              <a:rPr lang="en-US" sz="4400" dirty="0" err="1"/>
+              <a:t>igri</a:t>
+            </a:r>
+            <a:r>
+              <a:rPr lang="en-US" sz="4400" dirty="0"/>
+              <a:t>, taj </a:t>
+            </a:r>
+            <a:r>
+              <a:rPr lang="en-US" sz="4400" dirty="0" err="1"/>
+              <a:t>isečak</a:t>
+            </a:r>
+            <a:r>
+              <a:rPr lang="en-US" sz="4400" dirty="0"/>
+              <a:t> se </a:t>
+            </a:r>
+            <a:r>
+              <a:rPr lang="en-US" sz="4400" dirty="0" err="1"/>
+              <a:t>snima</a:t>
+            </a:r>
+            <a:r>
+              <a:rPr lang="en-US" sz="4400" dirty="0"/>
+              <a:t> </a:t>
+            </a:r>
+            <a:r>
+              <a:rPr lang="en-US" sz="4400" dirty="0" err="1"/>
+              <a:t>i</a:t>
+            </a:r>
+            <a:r>
+              <a:rPr lang="en-US" sz="4400" dirty="0"/>
+              <a:t> </a:t>
+            </a:r>
+            <a:r>
+              <a:rPr lang="en-US" sz="4400" dirty="0" err="1"/>
+              <a:t>na</a:t>
+            </a:r>
+            <a:r>
+              <a:rPr lang="en-US" sz="4400" dirty="0"/>
+              <a:t> </a:t>
+            </a:r>
+            <a:r>
+              <a:rPr lang="en-US" sz="4400" dirty="0" err="1"/>
+              <a:t>osnovu</a:t>
+            </a:r>
+            <a:r>
+              <a:rPr lang="en-US" sz="4400" dirty="0"/>
+              <a:t> </a:t>
+            </a:r>
+            <a:r>
+              <a:rPr lang="en-US" sz="4400" dirty="0" err="1"/>
+              <a:t>njega</a:t>
+            </a:r>
+            <a:r>
+              <a:rPr lang="en-US" sz="4400" dirty="0"/>
+              <a:t> se </a:t>
+            </a:r>
+            <a:r>
+              <a:rPr lang="en-US" sz="4400" dirty="0" err="1"/>
+              <a:t>pravi</a:t>
+            </a:r>
+            <a:r>
+              <a:rPr lang="en-US" sz="4400" dirty="0"/>
+              <a:t> </a:t>
+            </a:r>
+            <a:r>
+              <a:rPr lang="en-US" sz="4400" dirty="0" err="1"/>
+              <a:t>novi</a:t>
+            </a:r>
+            <a:r>
+              <a:rPr lang="en-US" sz="4400" dirty="0"/>
+              <a:t> fingerprint. </a:t>
+            </a:r>
+            <a:r>
+              <a:rPr lang="en-US" sz="4400" dirty="0" err="1"/>
+              <a:t>Dobijeni</a:t>
+            </a:r>
+            <a:r>
+              <a:rPr lang="en-US" sz="4400" dirty="0"/>
+              <a:t> fingerprint se </a:t>
+            </a:r>
+            <a:r>
+              <a:rPr lang="en-US" sz="4400" dirty="0" err="1"/>
+              <a:t>poredi</a:t>
+            </a:r>
+            <a:r>
+              <a:rPr lang="en-US" sz="4400" dirty="0"/>
+              <a:t> </a:t>
+            </a:r>
+            <a:r>
+              <a:rPr lang="en-US" sz="4400" dirty="0" err="1"/>
+              <a:t>sa</a:t>
+            </a:r>
+            <a:r>
+              <a:rPr lang="en-US" sz="4400" dirty="0"/>
+              <a:t> </a:t>
+            </a:r>
+            <a:r>
+              <a:rPr lang="en-US" sz="4400" dirty="0" err="1"/>
+              <a:t>podacima</a:t>
+            </a:r>
+            <a:r>
+              <a:rPr lang="en-US" sz="4400" dirty="0"/>
+              <a:t> u </a:t>
+            </a:r>
+            <a:r>
+              <a:rPr lang="en-US" sz="4400" dirty="0" err="1"/>
+              <a:t>bazi</a:t>
+            </a:r>
+            <a:r>
+              <a:rPr lang="en-US" sz="4400" dirty="0"/>
+              <a:t>, </a:t>
+            </a:r>
+            <a:r>
+              <a:rPr lang="en-US" sz="4400" dirty="0" err="1"/>
+              <a:t>i</a:t>
+            </a:r>
+            <a:r>
+              <a:rPr lang="en-US" sz="4400" dirty="0"/>
+              <a:t> </a:t>
+            </a:r>
+            <a:r>
+              <a:rPr lang="en-US" sz="4400" dirty="0" err="1"/>
+              <a:t>kao</a:t>
+            </a:r>
+            <a:r>
+              <a:rPr lang="en-US" sz="4400" dirty="0"/>
+              <a:t> </a:t>
+            </a:r>
+            <a:r>
+              <a:rPr lang="en-US" sz="4400" dirty="0" err="1"/>
+              <a:t>rezultat</a:t>
+            </a:r>
+            <a:r>
+              <a:rPr lang="en-US" sz="4400" dirty="0"/>
+              <a:t> se </a:t>
+            </a:r>
+            <a:r>
+              <a:rPr lang="en-US" sz="4400" dirty="0" err="1"/>
+              <a:t>uzima</a:t>
+            </a:r>
+            <a:r>
+              <a:rPr lang="en-US" sz="4400" dirty="0"/>
+              <a:t> </a:t>
+            </a:r>
+            <a:r>
+              <a:rPr lang="en-US" sz="4400" dirty="0" err="1"/>
+              <a:t>pesma</a:t>
+            </a:r>
+            <a:r>
+              <a:rPr lang="en-US" sz="4400" dirty="0"/>
+              <a:t> </a:t>
+            </a:r>
+            <a:r>
+              <a:rPr lang="en-US" sz="4400" dirty="0" err="1"/>
+              <a:t>čiji</a:t>
+            </a:r>
+            <a:r>
+              <a:rPr lang="en-US" sz="4400" dirty="0"/>
+              <a:t> fingerprint </a:t>
+            </a:r>
+            <a:r>
+              <a:rPr lang="en-US" sz="4400" dirty="0" err="1"/>
+              <a:t>iz</a:t>
+            </a:r>
+            <a:r>
+              <a:rPr lang="en-US" sz="4400" dirty="0"/>
+              <a:t> </a:t>
+            </a:r>
+            <a:r>
+              <a:rPr lang="en-US" sz="4400" dirty="0" err="1"/>
+              <a:t>baze</a:t>
+            </a:r>
+            <a:r>
+              <a:rPr lang="en-US" sz="4400" dirty="0"/>
+              <a:t> se </a:t>
+            </a:r>
+            <a:r>
+              <a:rPr lang="en-US" sz="4400" dirty="0" err="1"/>
+              <a:t>najviše</a:t>
+            </a:r>
+            <a:r>
+              <a:rPr lang="en-US" sz="4400" dirty="0"/>
+              <a:t> </a:t>
+            </a:r>
+            <a:r>
+              <a:rPr lang="en-US" sz="4400" dirty="0" err="1"/>
+              <a:t>podudara</a:t>
+            </a:r>
+            <a:r>
+              <a:rPr lang="en-US" sz="4400" dirty="0"/>
+              <a:t> </a:t>
+            </a:r>
+            <a:r>
+              <a:rPr lang="en-US" sz="4400" dirty="0" err="1"/>
+              <a:t>sa</a:t>
+            </a:r>
+            <a:r>
+              <a:rPr lang="en-US" sz="4400" dirty="0"/>
+              <a:t> </a:t>
+            </a:r>
+            <a:r>
+              <a:rPr lang="en-US" sz="4400" dirty="0" err="1"/>
+              <a:t>novim</a:t>
+            </a:r>
+            <a:r>
+              <a:rPr lang="en-US" sz="4400" dirty="0"/>
+              <a:t> </a:t>
+            </a:r>
+            <a:r>
+              <a:rPr lang="en-US" sz="4400" dirty="0" err="1"/>
+              <a:t>fingerprintom</a:t>
+            </a:r>
+            <a:r>
+              <a:rPr lang="en-US" sz="4400" dirty="0"/>
+              <a:t>.</a:t>
+            </a:r>
           </a:p>
         </p:txBody>
       </p:sp>
@@ -6969,10 +7365,9 @@
               <a:defRPr/>
             </a:pPr>
             <a:r>
-              <a:rPr lang="en-US" sz="4000" i="1" smtClean="0"/>
+              <a:rPr lang="en-US" sz="4000" i="1"/>
               <a:t>Primer spektrograma</a:t>
             </a:r>
-            <a:endParaRPr lang="en-US" sz="4000" i="1"/>
           </a:p>
         </p:txBody>
       </p:sp>
@@ -7129,7 +7524,7 @@
               </a:spcAft>
             </a:pPr>
             <a:r>
-              <a:rPr lang="en-US" sz="4800" b="1" noProof="1" smtClean="0">
+              <a:rPr lang="en-US" sz="4800" b="1" noProof="1">
                 <a:solidFill>
                   <a:schemeClr val="accent1">
                     <a:lumMod val="75000"/>
@@ -7139,14 +7534,6 @@
               </a:rPr>
               <a:t>Prepoznavanje ponuđenih odgovora</a:t>
             </a:r>
-            <a:endParaRPr lang="en-US" sz="4800" b="1" noProof="1">
-              <a:solidFill>
-                <a:schemeClr val="accent1">
-                  <a:lumMod val="75000"/>
-                </a:schemeClr>
-              </a:solidFill>
-              <a:latin typeface="+mj-lt"/>
-            </a:endParaRPr>
           </a:p>
         </p:txBody>
       </p:sp>
@@ -7174,29 +7561,29 @@
           <a:p>
             <a:pPr algn="just"/>
             <a:r>
-              <a:rPr lang="en-US" sz="4400" smtClean="0"/>
+              <a:rPr lang="en-US" sz="4400"/>
               <a:t>Nakon što algoritam prepozna pesmu iz baze, potrebno je odrediti koje dugme na ekranu predtsavlja tu pesmu. Za čitanje teksta sa ekrana korištena je metoda  OCR (</a:t>
             </a:r>
             <a:r>
-              <a:rPr lang="en-US" sz="4400" i="1" smtClean="0"/>
+              <a:rPr lang="en-US" sz="4400" i="1"/>
               <a:t>Optical Character Recognition</a:t>
             </a:r>
             <a:r>
-              <a:rPr lang="en-US" sz="4400" smtClean="0"/>
+              <a:rPr lang="en-US" sz="4400"/>
               <a:t>).  </a:t>
             </a:r>
           </a:p>
           <a:p>
             <a:pPr algn="just"/>
             <a:r>
-              <a:rPr lang="en-US" sz="4400" smtClean="0"/>
+              <a:rPr lang="en-US" sz="4400"/>
               <a:t>Neuronska mreža je trenirana na osnovu znakova koji se pojavljuju u igri (slova, brojevi, neki specijalni znakovi). </a:t>
             </a:r>
           </a:p>
           <a:p>
             <a:pPr algn="just"/>
             <a:r>
-              <a:rPr lang="en-US" sz="4400" smtClean="0"/>
+              <a:rPr lang="en-US" sz="4400"/>
               <a:t>Prilikom prepoznavanja, za svaki od 4 ponuđena odgovora izdvajaju se konture i šalju se neuronskoj mreži koja prepoznaje karaktere. Od 4 dobijena rezultata bira se tekst koji je najsličniji nazivu ili imenu</a:t>
             </a:r>
           </a:p>
@@ -7355,7 +7742,7 @@
               </a:spcAft>
             </a:pPr>
             <a:r>
-              <a:rPr lang="en-US" sz="4800" b="1" noProof="1" smtClean="0">
+              <a:rPr lang="en-US" sz="4800" b="1" noProof="1">
                 <a:solidFill>
                   <a:schemeClr val="accent1">
                     <a:lumMod val="75000"/>
@@ -7365,14 +7752,6 @@
               </a:rPr>
               <a:t>Rezultati</a:t>
             </a:r>
-            <a:endParaRPr lang="en-US" sz="4800" b="1" noProof="1">
-              <a:solidFill>
-                <a:schemeClr val="accent1">
-                  <a:lumMod val="75000"/>
-                </a:schemeClr>
-              </a:solidFill>
-              <a:latin typeface="+mj-lt"/>
-            </a:endParaRPr>
           </a:p>
         </p:txBody>
       </p:sp>
@@ -7400,15 +7779,103 @@
           <a:p>
             <a:pPr algn="just"/>
             <a:r>
-              <a:rPr lang="en-US" sz="4400" smtClean="0"/>
-              <a:t>Na osnovu 20 odigranih partija sa po 5 pogađanja, program je prosečno prepoznavao 4 od 5 pesama, pa možemo zaključiti da je  preciznost (</a:t>
-            </a:r>
-            <a:r>
-              <a:rPr lang="en-US" sz="4400" i="1" smtClean="0"/>
+              <a:rPr lang="en-US" sz="4400" dirty="0"/>
+              <a:t>Na </a:t>
+            </a:r>
+            <a:r>
+              <a:rPr lang="en-US" sz="4400" dirty="0" err="1"/>
+              <a:t>osnovu</a:t>
+            </a:r>
+            <a:r>
+              <a:rPr lang="en-US" sz="4400" dirty="0"/>
+              <a:t> 20 </a:t>
+            </a:r>
+            <a:r>
+              <a:rPr lang="en-US" sz="4400" dirty="0" err="1"/>
+              <a:t>odigranih</a:t>
+            </a:r>
+            <a:r>
+              <a:rPr lang="en-US" sz="4400" dirty="0"/>
+              <a:t> </a:t>
+            </a:r>
+            <a:r>
+              <a:rPr lang="en-US" sz="4400" dirty="0" err="1"/>
+              <a:t>partija</a:t>
+            </a:r>
+            <a:r>
+              <a:rPr lang="en-US" sz="4400" dirty="0"/>
+              <a:t> </a:t>
+            </a:r>
+            <a:r>
+              <a:rPr lang="en-US" sz="4400" dirty="0" err="1"/>
+              <a:t>sa</a:t>
+            </a:r>
+            <a:r>
+              <a:rPr lang="en-US" sz="4400" dirty="0"/>
+              <a:t> po 5 </a:t>
+            </a:r>
+            <a:r>
+              <a:rPr lang="en-US" sz="4400" dirty="0" err="1"/>
+              <a:t>pogađanja</a:t>
+            </a:r>
+            <a:r>
+              <a:rPr lang="en-US" sz="4400" dirty="0"/>
+              <a:t>, program je </a:t>
+            </a:r>
+            <a:r>
+              <a:rPr lang="en-US" sz="4400" dirty="0" err="1"/>
+              <a:t>prosečno</a:t>
+            </a:r>
+            <a:r>
+              <a:rPr lang="en-US" sz="4400" dirty="0"/>
+              <a:t> </a:t>
+            </a:r>
+            <a:r>
+              <a:rPr lang="en-US" sz="4400" dirty="0" err="1"/>
+              <a:t>prepoznavao</a:t>
+            </a:r>
+            <a:r>
+              <a:rPr lang="en-US" sz="4400" dirty="0"/>
+              <a:t> 4 od 5 </a:t>
+            </a:r>
+            <a:r>
+              <a:rPr lang="en-US" sz="4400" dirty="0" err="1"/>
+              <a:t>pesama</a:t>
+            </a:r>
+            <a:r>
+              <a:rPr lang="en-US" sz="4400" dirty="0"/>
+              <a:t>, pa </a:t>
+            </a:r>
+            <a:r>
+              <a:rPr lang="en-US" sz="4400" dirty="0" err="1"/>
+              <a:t>možemo</a:t>
+            </a:r>
+            <a:r>
+              <a:rPr lang="en-US" sz="4400" dirty="0"/>
+              <a:t> </a:t>
+            </a:r>
+            <a:r>
+              <a:rPr lang="en-US" sz="4400" dirty="0" err="1"/>
+              <a:t>zaključiti</a:t>
+            </a:r>
+            <a:r>
+              <a:rPr lang="en-US" sz="4400" dirty="0"/>
+              <a:t> da je  </a:t>
+            </a:r>
+            <a:r>
+              <a:rPr lang="en-US" sz="4400" dirty="0" err="1"/>
+              <a:t>preciznost</a:t>
+            </a:r>
+            <a:r>
+              <a:rPr lang="en-US" sz="4400" dirty="0"/>
+              <a:t> (</a:t>
+            </a:r>
+            <a:r>
+              <a:rPr lang="en-US" sz="4400" i="1" dirty="0"/>
               <a:t>accuracy</a:t>
             </a:r>
             <a:r>
-              <a:rPr lang="en-US" sz="4400" smtClean="0"/>
+              <a:rPr lang="en-US" sz="4400" dirty="0"/>
               <a:t>) 80%. </a:t>
             </a:r>
           </a:p>
@@ -7518,10 +7985,9 @@
               <a:defRPr/>
             </a:pPr>
             <a:r>
-              <a:rPr lang="en-US" sz="4000" i="1" smtClean="0"/>
+              <a:rPr lang="en-US" sz="4000" i="1"/>
               <a:t>Karakteri za treniranje neuronske mreže</a:t>
             </a:r>
-            <a:endParaRPr lang="en-US" sz="4000" i="1"/>
           </a:p>
         </p:txBody>
       </p:sp>
@@ -7549,7 +8015,7 @@
           <a:p>
             <a:pPr algn="just"/>
             <a:r>
-              <a:rPr lang="en-US" sz="4400" smtClean="0"/>
+              <a:rPr lang="en-US" sz="4400"/>
               <a:t>izvođača prepoznate pesme, program odabira taj odgovor i nastavlja dalje sa igrom.</a:t>
             </a:r>
           </a:p>
@@ -7580,10 +8046,9 @@
               <a:defRPr/>
             </a:pPr>
             <a:r>
-              <a:rPr lang="en-US" sz="4000" i="1" smtClean="0"/>
+              <a:rPr lang="en-US" sz="4000" i="1"/>
               <a:t>Postupak popunjavanja baze</a:t>
             </a:r>
-            <a:endParaRPr lang="en-US" sz="4000" i="1"/>
           </a:p>
         </p:txBody>
       </p:sp>
@@ -7740,7 +8205,7 @@
               </a:spcAft>
             </a:pPr>
             <a:r>
-              <a:rPr lang="en-US" sz="4800" b="1" noProof="1" smtClean="0">
+              <a:rPr lang="en-US" sz="4800" b="1" noProof="1">
                 <a:solidFill>
                   <a:schemeClr val="accent1">
                     <a:lumMod val="75000"/>
@@ -7750,14 +8215,6 @@
               </a:rPr>
               <a:t>Zaključak</a:t>
             </a:r>
-            <a:endParaRPr lang="en-US" sz="4800" b="1" noProof="1">
-              <a:solidFill>
-                <a:schemeClr val="accent1">
-                  <a:lumMod val="75000"/>
-                </a:schemeClr>
-              </a:solidFill>
-              <a:latin typeface="+mj-lt"/>
-            </a:endParaRPr>
           </a:p>
         </p:txBody>
       </p:sp>
@@ -7785,7 +8242,7 @@
           <a:p>
             <a:pPr algn="just"/>
             <a:r>
-              <a:rPr lang="en-US" sz="4400" smtClean="0"/>
+              <a:rPr lang="en-US" sz="4400"/>
               <a:t>Program radi prilično dobro za većinu slučajeva, odnosno za slučajeve kada tražena pesma postoji u bazi. Mogao bi se unaprediti proširivanjem baze novim pesmama koje se pojavljuju u igri (npr. ukoliko ne prepozna pesmu, da se nova pesma doda u bazu). Takođe, tačnost bi se mogla povećati dužim snimanjem, ali bi se program tada igrao sporije i dobijao bi manje poena u igri. </a:t>
             </a:r>
           </a:p>
@@ -7801,13 +8258,6 @@
   <p:clrMapOvr>
     <a:masterClrMapping/>
   </p:clrMapOvr>
-  <p:timing>
-    <p:tnLst>
-      <p:par>
-        <p:cTn id="1" dur="indefinite" restart="never" nodeType="tmRoot"/>
-      </p:par>
-    </p:tnLst>
-  </p:timing>
 </p:sld>
 </file>
 

</xml_diff>